<commit_message>
Revised favicon.ico Revised css style related with favicon.ico Revised tools.client.service.js to remove redundant data items Added slides constants Added nodes.client.service.js
</commit_message>
<xml_diff>
--- a/public/modules/core/img/brand/favicon.pptx
+++ b/public/modules/core/img/brand/favicon.pptx
@@ -104,6 +104,22 @@
       </a:defRPr>
     </a:lvl9pPr>
   </p:defaultTextStyle>
+  <p:extLst>
+    <p:ext uri="{EFAFB233-063F-42B5-8137-9DF3F51BA10A}">
+      <p15:sldGuideLst xmlns:p15="http://schemas.microsoft.com/office/powerpoint/2012/main">
+        <p15:guide id="1" orient="horz" pos="2160">
+          <p15:clr>
+            <a:srgbClr val="A4A3A4"/>
+          </p15:clr>
+        </p15:guide>
+        <p15:guide id="2" pos="2880">
+          <p15:clr>
+            <a:srgbClr val="A4A3A4"/>
+          </p15:clr>
+        </p15:guide>
+      </p15:sldGuideLst>
+    </p:ext>
+  </p:extLst>
 </p:presentation>
 </file>
 
@@ -3397,7 +3413,7 @@
             <a:avLst/>
           </a:prstGeom>
           <a:solidFill>
-            <a:schemeClr val="bg1"/>
+            <a:srgbClr val="E8373E"/>
           </a:solidFill>
           <a:ln>
             <a:noFill/>
@@ -3457,7 +3473,7 @@
               <a:avLst/>
             </a:prstGeom>
             <a:solidFill>
-              <a:srgbClr val="E8373E"/>
+              <a:schemeClr val="bg1"/>
             </a:solidFill>
             <a:ln>
               <a:noFill/>
@@ -3511,7 +3527,7 @@
               <a:avLst/>
             </a:prstGeom>
             <a:solidFill>
-              <a:schemeClr val="bg1"/>
+              <a:srgbClr val="E8373E"/>
             </a:solidFill>
             <a:ln>
               <a:noFill/>

</xml_diff>